<commit_message>
Improved demos of manual ARMA
</commit_message>
<xml_diff>
--- a/lecture-timeseries.pptx
+++ b/lecture-timeseries.pptx
@@ -254,7 +254,7 @@
           <a:p>
             <a:fld id="{1ED7098F-87C7-3046-B8E1-0317C0D8D9C4}" type="datetimeFigureOut">
               <a:rPr lang="en-US" smtClean="0"/>
-              <a:t>2/12/26</a:t>
+              <a:t>2/21/26</a:t>
             </a:fld>
             <a:endParaRPr lang="en-US"/>
           </a:p>
@@ -420,7 +420,7 @@
           <a:p>
             <a:fld id="{A83074A2-D88D-8F43-B619-246CA3905610}" type="datetimeFigureOut">
               <a:rPr lang="en-US" smtClean="0"/>
-              <a:t>2/12/26</a:t>
+              <a:t>2/21/26</a:t>
             </a:fld>
             <a:endParaRPr lang="en-US"/>
           </a:p>
@@ -6166,8 +6166,8 @@
           <a:chExt cx="0" cy="0"/>
         </a:xfrm>
       </p:grpSpPr>
-      <mc:AlternateContent xmlns:mc="http://schemas.openxmlformats.org/markup-compatibility/2006" xmlns:a14="http://schemas.microsoft.com/office/drawing/2010/main">
-        <mc:Choice Requires="a14">
+      <mc:AlternateContent xmlns:mc="http://schemas.openxmlformats.org/markup-compatibility/2006">
+        <mc:Choice xmlns:a14="http://schemas.microsoft.com/office/drawing/2010/main" Requires="a14">
           <p:sp>
             <p:nvSpPr>
               <p:cNvPr id="2" name="Tijdelijke aanduiding voor tekst 1">
@@ -7446,12 +7446,171 @@
               </a:p>
               <a:p>
                 <a:pPr marL="728653" lvl="1" indent="-342900"/>
+                <a:r>
+                  <a:rPr lang="nl-NL" dirty="0" err="1"/>
+                  <a:t>Autoregression</a:t>
+                </a:r>
+                <a:r>
+                  <a:rPr lang="nl-NL" dirty="0"/>
+                  <a:t>: </a:t>
+                </a:r>
+                <a:r>
+                  <a:rPr lang="nl-NL" dirty="0" err="1"/>
+                  <a:t>correlating</a:t>
+                </a:r>
+                <a:r>
+                  <a:rPr lang="nl-NL" dirty="0"/>
+                  <a:t> </a:t>
+                </a:r>
+                <a:r>
+                  <a:rPr lang="nl-NL" dirty="0" err="1"/>
+                  <a:t>values</a:t>
+                </a:r>
+                <a:r>
+                  <a:rPr lang="nl-NL" dirty="0"/>
+                  <a:t> </a:t>
+                </a:r>
+                <a:r>
+                  <a:rPr lang="nl-NL" dirty="0" err="1"/>
+                  <a:t>to</a:t>
+                </a:r>
+                <a:r>
+                  <a:rPr lang="nl-NL" dirty="0"/>
+                  <a:t> </a:t>
+                </a:r>
+                <a:r>
+                  <a:rPr lang="nl-NL" dirty="0" err="1"/>
+                  <a:t>your</a:t>
+                </a:r>
+                <a:r>
+                  <a:rPr lang="nl-NL" dirty="0"/>
+                  <a:t> </a:t>
+                </a:r>
+                <a:r>
+                  <a:rPr lang="nl-NL" dirty="0" err="1"/>
+                  <a:t>own</a:t>
+                </a:r>
+                <a:r>
+                  <a:rPr lang="nl-NL" dirty="0"/>
+                  <a:t> </a:t>
+                </a:r>
+                <a:r>
+                  <a:rPr lang="nl-NL" dirty="0" err="1"/>
+                  <a:t>previous</a:t>
+                </a:r>
+                <a:r>
+                  <a:rPr lang="nl-NL" dirty="0"/>
+                  <a:t> </a:t>
+                </a:r>
+                <a:r>
+                  <a:rPr lang="nl-NL" dirty="0" err="1"/>
+                  <a:t>values</a:t>
+                </a:r>
+                <a:r>
+                  <a:rPr lang="nl-NL" dirty="0"/>
+                  <a:t>.</a:t>
+                </a:r>
+              </a:p>
+              <a:p>
+                <a:pPr marL="728653" lvl="1" indent="-342900"/>
+                <a:r>
+                  <a:rPr lang="nl-NL" dirty="0" err="1"/>
+                  <a:t>Moving</a:t>
+                </a:r>
+                <a:r>
+                  <a:rPr lang="nl-NL" dirty="0"/>
+                  <a:t> </a:t>
+                </a:r>
+                <a:r>
+                  <a:rPr lang="nl-NL" dirty="0" err="1"/>
+                  <a:t>average</a:t>
+                </a:r>
+                <a:r>
+                  <a:rPr lang="nl-NL" dirty="0"/>
+                  <a:t>: </a:t>
+                </a:r>
+                <a:r>
+                  <a:rPr lang="nl-NL" dirty="0" err="1"/>
+                  <a:t>calculate</a:t>
+                </a:r>
+                <a:r>
+                  <a:rPr lang="nl-NL" dirty="0"/>
+                  <a:t> </a:t>
+                </a:r>
+                <a:r>
+                  <a:rPr lang="nl-NL" dirty="0" err="1"/>
+                  <a:t>an</a:t>
+                </a:r>
+                <a:r>
+                  <a:rPr lang="nl-NL" dirty="0"/>
+                  <a:t> </a:t>
+                </a:r>
+                <a:r>
+                  <a:rPr lang="nl-NL" dirty="0" err="1"/>
+                  <a:t>average</a:t>
+                </a:r>
+                <a:r>
+                  <a:rPr lang="nl-NL" dirty="0"/>
+                  <a:t> ov </a:t>
+                </a:r>
+                <a:r>
+                  <a:rPr lang="nl-NL" dirty="0" err="1"/>
+                  <a:t>all</a:t>
+                </a:r>
+                <a:r>
+                  <a:rPr lang="nl-NL" dirty="0"/>
+                  <a:t> </a:t>
+                </a:r>
+                <a:r>
+                  <a:rPr lang="nl-NL" dirty="0" err="1"/>
+                  <a:t>previous</a:t>
+                </a:r>
+                <a:r>
+                  <a:rPr lang="nl-NL" dirty="0"/>
+                  <a:t> </a:t>
+                </a:r>
+                <a:r>
+                  <a:rPr lang="nl-NL" dirty="0" err="1"/>
+                  <a:t>values</a:t>
+                </a:r>
+                <a:r>
+                  <a:rPr lang="nl-NL" dirty="0"/>
+                  <a:t> </a:t>
+                </a:r>
+                <a:r>
+                  <a:rPr lang="nl-NL" i="1" dirty="0" err="1"/>
+                  <a:t>that</a:t>
+                </a:r>
+                <a:r>
+                  <a:rPr lang="nl-NL" i="1" dirty="0"/>
+                  <a:t> updates as more </a:t>
+                </a:r>
+                <a:r>
+                  <a:rPr lang="nl-NL" i="1" dirty="0" err="1"/>
+                  <a:t>values</a:t>
+                </a:r>
+                <a:r>
+                  <a:rPr lang="nl-NL" i="1" dirty="0"/>
+                  <a:t> </a:t>
+                </a:r>
+                <a:r>
+                  <a:rPr lang="nl-NL" i="1"/>
+                  <a:t>are added.</a:t>
+                </a:r>
+                <a:endParaRPr lang="nl-NL" dirty="0"/>
+              </a:p>
+              <a:p>
+                <a:pPr marL="728653" lvl="1" indent="-342900"/>
+                <a:endParaRPr lang="nl-NL" dirty="0"/>
+              </a:p>
+              <a:p>
+                <a:pPr marL="728653" lvl="1" indent="-342900"/>
                 <a:endParaRPr lang="nl-NL" dirty="0"/>
               </a:p>
             </p:txBody>
           </p:sp>
         </mc:Choice>
-        <mc:Fallback xmlns="">
+        <mc:Fallback>
           <p:sp>
             <p:nvSpPr>
               <p:cNvPr id="2" name="Tijdelijke aanduiding voor tekst 1">
@@ -8698,6 +8857,12 @@
 </file>
 
 <file path=customXml/item1.xml><?xml version="1.0" encoding="utf-8"?>
+<p:properties xmlns:p="http://schemas.microsoft.com/office/2006/metadata/properties" xmlns:xsi="http://www.w3.org/2001/XMLSchema-instance">
+  <documentManagement/>
+</p:properties>
+</file>
+
+<file path=customXml/item2.xml><?xml version="1.0" encoding="utf-8"?>
 <ct:contentTypeSchema xmlns:ct="http://schemas.microsoft.com/office/2006/metadata/contentType" xmlns:ma="http://schemas.microsoft.com/office/2006/metadata/properties/metaAttributes" ct:_="" ma:_="" ma:contentTypeName="Document" ma:contentTypeID="0x010100B2C6846675690041B0AEF76721A33550" ma:contentTypeVersion="12" ma:contentTypeDescription="Een nieuw document maken." ma:contentTypeScope="" ma:versionID="7d80b5b27cb88b7e670b1fbb7cd7de23">
   <xsd:schema xmlns:xsd="http://www.w3.org/2001/XMLSchema" xmlns:xs="http://www.w3.org/2001/XMLSchema" xmlns:p="http://schemas.microsoft.com/office/2006/metadata/properties" xmlns:ns2="6b01692f-8f45-4310-abfd-accd438f234f" xmlns:ns3="41d33a03-4c74-4b4d-8466-39dbc86d9cdb" targetNamespace="http://schemas.microsoft.com/office/2006/metadata/properties" ma:root="true" ma:fieldsID="2679454ac823c4dc22358f51a5683c7b" ns2:_="" ns3:_="">
     <xsd:import namespace="6b01692f-8f45-4310-abfd-accd438f234f"/>
@@ -8914,12 +9079,6 @@
 </ct:contentTypeSchema>
 </file>
 
-<file path=customXml/item2.xml><?xml version="1.0" encoding="utf-8"?>
-<p:properties xmlns:p="http://schemas.microsoft.com/office/2006/metadata/properties" xmlns:xsi="http://www.w3.org/2001/XMLSchema-instance">
-  <documentManagement/>
-</p:properties>
-</file>
-
 <file path=customXml/item3.xml><?xml version="1.0" encoding="utf-8"?>
 <?mso-contentType ?>
 <FormTemplates xmlns="http://schemas.microsoft.com/sharepoint/v3/contenttype/forms">
@@ -8930,6 +9089,23 @@
 </file>
 
 <file path=customXml/itemProps1.xml><?xml version="1.0" encoding="utf-8"?>
+<ds:datastoreItem xmlns:ds="http://schemas.openxmlformats.org/officeDocument/2006/customXml" ds:itemID="{665827D5-5A12-48FB-BA20-1E7CB9BA5BA1}">
+  <ds:schemaRefs>
+    <ds:schemaRef ds:uri="http://schemas.microsoft.com/office/2006/documentManagement/types"/>
+    <ds:schemaRef ds:uri="http://schemas.openxmlformats.org/package/2006/metadata/core-properties"/>
+    <ds:schemaRef ds:uri="http://purl.org/dc/elements/1.1/"/>
+    <ds:schemaRef ds:uri="http://schemas.microsoft.com/office/2006/metadata/properties"/>
+    <ds:schemaRef ds:uri="67c6fd78-9e9e-49b0-99f6-392b7eb0c25b"/>
+    <ds:schemaRef ds:uri="http://purl.org/dc/terms/"/>
+    <ds:schemaRef ds:uri="http://schemas.microsoft.com/office/infopath/2007/PartnerControls"/>
+    <ds:schemaRef ds:uri="53aadeef-871c-4d8b-955c-28f1a1590244"/>
+    <ds:schemaRef ds:uri="http://www.w3.org/XML/1998/namespace"/>
+    <ds:schemaRef ds:uri="http://purl.org/dc/dcmitype/"/>
+  </ds:schemaRefs>
+</ds:datastoreItem>
+</file>
+
+<file path=customXml/itemProps2.xml><?xml version="1.0" encoding="utf-8"?>
 <ds:datastoreItem xmlns:ds="http://schemas.openxmlformats.org/officeDocument/2006/customXml" ds:itemID="{E5A48691-3E40-4B9C-9CEF-B13064CE8A2A}">
   <ds:schemaRefs>
     <ds:schemaRef ds:uri="http://schemas.microsoft.com/office/2006/metadata/contentType"/>
@@ -8948,23 +9124,6 @@
 </ds:datastoreItem>
 </file>
 
-<file path=customXml/itemProps2.xml><?xml version="1.0" encoding="utf-8"?>
-<ds:datastoreItem xmlns:ds="http://schemas.openxmlformats.org/officeDocument/2006/customXml" ds:itemID="{665827D5-5A12-48FB-BA20-1E7CB9BA5BA1}">
-  <ds:schemaRefs>
-    <ds:schemaRef ds:uri="http://schemas.microsoft.com/office/2006/documentManagement/types"/>
-    <ds:schemaRef ds:uri="http://schemas.openxmlformats.org/package/2006/metadata/core-properties"/>
-    <ds:schemaRef ds:uri="http://purl.org/dc/elements/1.1/"/>
-    <ds:schemaRef ds:uri="http://schemas.microsoft.com/office/2006/metadata/properties"/>
-    <ds:schemaRef ds:uri="67c6fd78-9e9e-49b0-99f6-392b7eb0c25b"/>
-    <ds:schemaRef ds:uri="http://purl.org/dc/terms/"/>
-    <ds:schemaRef ds:uri="http://schemas.microsoft.com/office/infopath/2007/PartnerControls"/>
-    <ds:schemaRef ds:uri="53aadeef-871c-4d8b-955c-28f1a1590244"/>
-    <ds:schemaRef ds:uri="http://www.w3.org/XML/1998/namespace"/>
-    <ds:schemaRef ds:uri="http://purl.org/dc/dcmitype/"/>
-  </ds:schemaRefs>
-</ds:datastoreItem>
-</file>
-
 <file path=customXml/itemProps3.xml><?xml version="1.0" encoding="utf-8"?>
 <ds:datastoreItem xmlns:ds="http://schemas.openxmlformats.org/officeDocument/2006/customXml" ds:itemID="{EE540D17-DFE7-4DA1-AB7C-9204237EF006}">
   <ds:schemaRefs>

</xml_diff>